<commit_message>
:pencil:, :books: :camera: phase two updates
</commit_message>
<xml_diff>
--- a/ENC222-0149_2017.pptx
+++ b/ENC222-0149_2017.pptx
@@ -261,7 +261,7 @@
           <a:p>
             <a:fld id="{BC6D784A-583B-48B5-A7BC-BB401D5EE48B}" type="datetimeFigureOut">
               <a:rPr lang="en-US" smtClean="0"/>
-              <a:t>5/21/2021</a:t>
+              <a:t>5/22/2021</a:t>
             </a:fld>
             <a:endParaRPr lang="en-US"/>
           </a:p>
@@ -459,7 +459,7 @@
           <a:p>
             <a:fld id="{BC6D784A-583B-48B5-A7BC-BB401D5EE48B}" type="datetimeFigureOut">
               <a:rPr lang="en-US" smtClean="0"/>
-              <a:t>5/21/2021</a:t>
+              <a:t>5/22/2021</a:t>
             </a:fld>
             <a:endParaRPr lang="en-US"/>
           </a:p>
@@ -667,7 +667,7 @@
           <a:p>
             <a:fld id="{BC6D784A-583B-48B5-A7BC-BB401D5EE48B}" type="datetimeFigureOut">
               <a:rPr lang="en-US" smtClean="0"/>
-              <a:t>5/21/2021</a:t>
+              <a:t>5/22/2021</a:t>
             </a:fld>
             <a:endParaRPr lang="en-US"/>
           </a:p>
@@ -865,7 +865,7 @@
           <a:p>
             <a:fld id="{BC6D784A-583B-48B5-A7BC-BB401D5EE48B}" type="datetimeFigureOut">
               <a:rPr lang="en-US" smtClean="0"/>
-              <a:t>5/21/2021</a:t>
+              <a:t>5/22/2021</a:t>
             </a:fld>
             <a:endParaRPr lang="en-US"/>
           </a:p>
@@ -1140,7 +1140,7 @@
           <a:p>
             <a:fld id="{BC6D784A-583B-48B5-A7BC-BB401D5EE48B}" type="datetimeFigureOut">
               <a:rPr lang="en-US" smtClean="0"/>
-              <a:t>5/21/2021</a:t>
+              <a:t>5/22/2021</a:t>
             </a:fld>
             <a:endParaRPr lang="en-US"/>
           </a:p>
@@ -1405,7 +1405,7 @@
           <a:p>
             <a:fld id="{BC6D784A-583B-48B5-A7BC-BB401D5EE48B}" type="datetimeFigureOut">
               <a:rPr lang="en-US" smtClean="0"/>
-              <a:t>5/21/2021</a:t>
+              <a:t>5/22/2021</a:t>
             </a:fld>
             <a:endParaRPr lang="en-US"/>
           </a:p>
@@ -1817,7 +1817,7 @@
           <a:p>
             <a:fld id="{BC6D784A-583B-48B5-A7BC-BB401D5EE48B}" type="datetimeFigureOut">
               <a:rPr lang="en-US" smtClean="0"/>
-              <a:t>5/21/2021</a:t>
+              <a:t>5/22/2021</a:t>
             </a:fld>
             <a:endParaRPr lang="en-US"/>
           </a:p>
@@ -1958,7 +1958,7 @@
           <a:p>
             <a:fld id="{BC6D784A-583B-48B5-A7BC-BB401D5EE48B}" type="datetimeFigureOut">
               <a:rPr lang="en-US" smtClean="0"/>
-              <a:t>5/21/2021</a:t>
+              <a:t>5/22/2021</a:t>
             </a:fld>
             <a:endParaRPr lang="en-US"/>
           </a:p>
@@ -2071,7 +2071,7 @@
           <a:p>
             <a:fld id="{BC6D784A-583B-48B5-A7BC-BB401D5EE48B}" type="datetimeFigureOut">
               <a:rPr lang="en-US" smtClean="0"/>
-              <a:t>5/21/2021</a:t>
+              <a:t>5/22/2021</a:t>
             </a:fld>
             <a:endParaRPr lang="en-US"/>
           </a:p>
@@ -2382,7 +2382,7 @@
           <a:p>
             <a:fld id="{BC6D784A-583B-48B5-A7BC-BB401D5EE48B}" type="datetimeFigureOut">
               <a:rPr lang="en-US" smtClean="0"/>
-              <a:t>5/21/2021</a:t>
+              <a:t>5/22/2021</a:t>
             </a:fld>
             <a:endParaRPr lang="en-US"/>
           </a:p>
@@ -2670,7 +2670,7 @@
           <a:p>
             <a:fld id="{BC6D784A-583B-48B5-A7BC-BB401D5EE48B}" type="datetimeFigureOut">
               <a:rPr lang="en-US" smtClean="0"/>
-              <a:t>5/21/2021</a:t>
+              <a:t>5/22/2021</a:t>
             </a:fld>
             <a:endParaRPr lang="en-US"/>
           </a:p>
@@ -2911,7 +2911,7 @@
           <a:p>
             <a:fld id="{BC6D784A-583B-48B5-A7BC-BB401D5EE48B}" type="datetimeFigureOut">
               <a:rPr lang="en-US" smtClean="0"/>
-              <a:t>5/21/2021</a:t>
+              <a:t>5/22/2021</a:t>
             </a:fld>
             <a:endParaRPr lang="en-US"/>
           </a:p>
@@ -3377,7 +3377,7 @@
                 <a:ea typeface="Times New Roman" panose="02020603050405020304" pitchFamily="18" charset="0"/>
                 <a:cs typeface="Times New Roman" panose="02020603050405020304" pitchFamily="18" charset="0"/>
               </a:rPr>
-              <a:t>Coupling Spatio-temporal Remote Sensing and automated </a:t>
+              <a:t>Spatio-temporal Remote Sensing, automated </a:t>
             </a:r>
             <a:r>
               <a:rPr lang="en-GB" sz="2400" b="1" i="1" u="sng" dirty="0">
@@ -3425,7 +3425,7 @@
                 <a:ea typeface="Times New Roman" panose="02020603050405020304" pitchFamily="18" charset="0"/>
                 <a:cs typeface="Times New Roman" panose="02020603050405020304" pitchFamily="18" charset="0"/>
               </a:rPr>
-              <a:t>sensors to monitor and predict HABs and cyanotoxins.</a:t>
+              <a:t>sensors &amp; ANN to monitor and predict HABs and cyanotoxins.</a:t>
             </a:r>
             <a:br>
               <a:rPr lang="en-US" sz="2400" dirty="0">
@@ -4168,7 +4168,7 @@
         </p:nvSpPr>
         <p:spPr>
           <a:xfrm>
-            <a:off x="3419475" y="5395106"/>
+            <a:off x="3292957" y="5440359"/>
             <a:ext cx="762000" cy="285750"/>
           </a:xfrm>
           <a:prstGeom prst="flowChartMultidocument">
@@ -4222,7 +4222,7 @@
         </p:nvSpPr>
         <p:spPr>
           <a:xfrm>
-            <a:off x="4410075" y="5395106"/>
+            <a:off x="5101820" y="5444191"/>
             <a:ext cx="762000" cy="285750"/>
           </a:xfrm>
           <a:prstGeom prst="flowChartMultidocument">
@@ -8135,6 +8135,385 @@
               <a:rPr lang="en-US" sz="1000" dirty="0"/>
               <a:t>GPS</a:t>
             </a:r>
+          </a:p>
+        </p:txBody>
+      </p:sp>
+      <p:sp>
+        <p:nvSpPr>
+          <p:cNvPr id="2" name="Rectangle 1">
+            <a:extLst>
+              <a:ext uri="{FF2B5EF4-FFF2-40B4-BE49-F238E27FC236}">
+                <a16:creationId xmlns:a16="http://schemas.microsoft.com/office/drawing/2014/main" id="{95B46695-53F3-4796-A556-9204EF1B47F7}"/>
+              </a:ext>
+            </a:extLst>
+          </p:cNvPr>
+          <p:cNvSpPr/>
+          <p:nvPr/>
+        </p:nvSpPr>
+        <p:spPr>
+          <a:xfrm>
+            <a:off x="4167283" y="5440359"/>
+            <a:ext cx="808222" cy="275531"/>
+          </a:xfrm>
+          <a:prstGeom prst="rect">
+            <a:avLst/>
+          </a:prstGeom>
+          <a:solidFill>
+            <a:schemeClr val="bg1"/>
+          </a:solidFill>
+        </p:spPr>
+        <p:style>
+          <a:lnRef idx="2">
+            <a:schemeClr val="accent1">
+              <a:shade val="50000"/>
+            </a:schemeClr>
+          </a:lnRef>
+          <a:fillRef idx="1">
+            <a:schemeClr val="accent1"/>
+          </a:fillRef>
+          <a:effectRef idx="0">
+            <a:schemeClr val="accent1"/>
+          </a:effectRef>
+          <a:fontRef idx="minor">
+            <a:schemeClr val="lt1"/>
+          </a:fontRef>
+        </p:style>
+        <p:txBody>
+          <a:bodyPr rtlCol="0" anchor="ctr"/>
+          <a:lstStyle/>
+          <a:p>
+            <a:pPr algn="ctr"/>
+            <a:endParaRPr lang="en-US"/>
+          </a:p>
+        </p:txBody>
+      </p:sp>
+      <p:sp>
+        <p:nvSpPr>
+          <p:cNvPr id="3" name="Freeform: Shape 2">
+            <a:extLst>
+              <a:ext uri="{FF2B5EF4-FFF2-40B4-BE49-F238E27FC236}">
+                <a16:creationId xmlns:a16="http://schemas.microsoft.com/office/drawing/2014/main" id="{341A0D17-2DA1-42E0-ABE5-91DEE6949D4F}"/>
+              </a:ext>
+            </a:extLst>
+          </p:cNvPr>
+          <p:cNvSpPr/>
+          <p:nvPr/>
+        </p:nvSpPr>
+        <p:spPr>
+          <a:xfrm>
+            <a:off x="4205619" y="5418227"/>
+            <a:ext cx="679374" cy="294353"/>
+          </a:xfrm>
+          <a:custGeom>
+            <a:avLst/>
+            <a:gdLst>
+              <a:gd name="connsiteX0" fmla="*/ 0 w 1055077"/>
+              <a:gd name="connsiteY0" fmla="*/ 196947 h 351692"/>
+              <a:gd name="connsiteX1" fmla="*/ 70338 w 1055077"/>
+              <a:gd name="connsiteY1" fmla="*/ 182880 h 351692"/>
+              <a:gd name="connsiteX2" fmla="*/ 140677 w 1055077"/>
+              <a:gd name="connsiteY2" fmla="*/ 154744 h 351692"/>
+              <a:gd name="connsiteX3" fmla="*/ 211015 w 1055077"/>
+              <a:gd name="connsiteY3" fmla="*/ 239151 h 351692"/>
+              <a:gd name="connsiteX4" fmla="*/ 239151 w 1055077"/>
+              <a:gd name="connsiteY4" fmla="*/ 309489 h 351692"/>
+              <a:gd name="connsiteX5" fmla="*/ 253218 w 1055077"/>
+              <a:gd name="connsiteY5" fmla="*/ 0 h 351692"/>
+              <a:gd name="connsiteX6" fmla="*/ 295421 w 1055077"/>
+              <a:gd name="connsiteY6" fmla="*/ 56271 h 351692"/>
+              <a:gd name="connsiteX7" fmla="*/ 337624 w 1055077"/>
+              <a:gd name="connsiteY7" fmla="*/ 196947 h 351692"/>
+              <a:gd name="connsiteX8" fmla="*/ 407963 w 1055077"/>
+              <a:gd name="connsiteY8" fmla="*/ 225083 h 351692"/>
+              <a:gd name="connsiteX9" fmla="*/ 492369 w 1055077"/>
+              <a:gd name="connsiteY9" fmla="*/ 323557 h 351692"/>
+              <a:gd name="connsiteX10" fmla="*/ 534572 w 1055077"/>
+              <a:gd name="connsiteY10" fmla="*/ 281354 h 351692"/>
+              <a:gd name="connsiteX11" fmla="*/ 576775 w 1055077"/>
+              <a:gd name="connsiteY11" fmla="*/ 84406 h 351692"/>
+              <a:gd name="connsiteX12" fmla="*/ 604911 w 1055077"/>
+              <a:gd name="connsiteY12" fmla="*/ 140677 h 351692"/>
+              <a:gd name="connsiteX13" fmla="*/ 633046 w 1055077"/>
+              <a:gd name="connsiteY13" fmla="*/ 351692 h 351692"/>
+              <a:gd name="connsiteX14" fmla="*/ 661181 w 1055077"/>
+              <a:gd name="connsiteY14" fmla="*/ 267286 h 351692"/>
+              <a:gd name="connsiteX15" fmla="*/ 675249 w 1055077"/>
+              <a:gd name="connsiteY15" fmla="*/ 337624 h 351692"/>
+              <a:gd name="connsiteX16" fmla="*/ 731520 w 1055077"/>
+              <a:gd name="connsiteY16" fmla="*/ 239151 h 351692"/>
+              <a:gd name="connsiteX17" fmla="*/ 759655 w 1055077"/>
+              <a:gd name="connsiteY17" fmla="*/ 196947 h 351692"/>
+              <a:gd name="connsiteX18" fmla="*/ 787791 w 1055077"/>
+              <a:gd name="connsiteY18" fmla="*/ 98474 h 351692"/>
+              <a:gd name="connsiteX19" fmla="*/ 801858 w 1055077"/>
+              <a:gd name="connsiteY19" fmla="*/ 168812 h 351692"/>
+              <a:gd name="connsiteX20" fmla="*/ 829994 w 1055077"/>
+              <a:gd name="connsiteY20" fmla="*/ 337624 h 351692"/>
+              <a:gd name="connsiteX21" fmla="*/ 844061 w 1055077"/>
+              <a:gd name="connsiteY21" fmla="*/ 182880 h 351692"/>
+              <a:gd name="connsiteX22" fmla="*/ 886264 w 1055077"/>
+              <a:gd name="connsiteY22" fmla="*/ 126609 h 351692"/>
+              <a:gd name="connsiteX23" fmla="*/ 942535 w 1055077"/>
+              <a:gd name="connsiteY23" fmla="*/ 337624 h 351692"/>
+              <a:gd name="connsiteX24" fmla="*/ 970671 w 1055077"/>
+              <a:gd name="connsiteY24" fmla="*/ 281354 h 351692"/>
+              <a:gd name="connsiteX25" fmla="*/ 1026941 w 1055077"/>
+              <a:gd name="connsiteY25" fmla="*/ 295421 h 351692"/>
+              <a:gd name="connsiteX26" fmla="*/ 1055077 w 1055077"/>
+              <a:gd name="connsiteY26" fmla="*/ 295421 h 351692"/>
+            </a:gdLst>
+            <a:ahLst/>
+            <a:cxnLst>
+              <a:cxn ang="0">
+                <a:pos x="connsiteX0" y="connsiteY0"/>
+              </a:cxn>
+              <a:cxn ang="0">
+                <a:pos x="connsiteX1" y="connsiteY1"/>
+              </a:cxn>
+              <a:cxn ang="0">
+                <a:pos x="connsiteX2" y="connsiteY2"/>
+              </a:cxn>
+              <a:cxn ang="0">
+                <a:pos x="connsiteX3" y="connsiteY3"/>
+              </a:cxn>
+              <a:cxn ang="0">
+                <a:pos x="connsiteX4" y="connsiteY4"/>
+              </a:cxn>
+              <a:cxn ang="0">
+                <a:pos x="connsiteX5" y="connsiteY5"/>
+              </a:cxn>
+              <a:cxn ang="0">
+                <a:pos x="connsiteX6" y="connsiteY6"/>
+              </a:cxn>
+              <a:cxn ang="0">
+                <a:pos x="connsiteX7" y="connsiteY7"/>
+              </a:cxn>
+              <a:cxn ang="0">
+                <a:pos x="connsiteX8" y="connsiteY8"/>
+              </a:cxn>
+              <a:cxn ang="0">
+                <a:pos x="connsiteX9" y="connsiteY9"/>
+              </a:cxn>
+              <a:cxn ang="0">
+                <a:pos x="connsiteX10" y="connsiteY10"/>
+              </a:cxn>
+              <a:cxn ang="0">
+                <a:pos x="connsiteX11" y="connsiteY11"/>
+              </a:cxn>
+              <a:cxn ang="0">
+                <a:pos x="connsiteX12" y="connsiteY12"/>
+              </a:cxn>
+              <a:cxn ang="0">
+                <a:pos x="connsiteX13" y="connsiteY13"/>
+              </a:cxn>
+              <a:cxn ang="0">
+                <a:pos x="connsiteX14" y="connsiteY14"/>
+              </a:cxn>
+              <a:cxn ang="0">
+                <a:pos x="connsiteX15" y="connsiteY15"/>
+              </a:cxn>
+              <a:cxn ang="0">
+                <a:pos x="connsiteX16" y="connsiteY16"/>
+              </a:cxn>
+              <a:cxn ang="0">
+                <a:pos x="connsiteX17" y="connsiteY17"/>
+              </a:cxn>
+              <a:cxn ang="0">
+                <a:pos x="connsiteX18" y="connsiteY18"/>
+              </a:cxn>
+              <a:cxn ang="0">
+                <a:pos x="connsiteX19" y="connsiteY19"/>
+              </a:cxn>
+              <a:cxn ang="0">
+                <a:pos x="connsiteX20" y="connsiteY20"/>
+              </a:cxn>
+              <a:cxn ang="0">
+                <a:pos x="connsiteX21" y="connsiteY21"/>
+              </a:cxn>
+              <a:cxn ang="0">
+                <a:pos x="connsiteX22" y="connsiteY22"/>
+              </a:cxn>
+              <a:cxn ang="0">
+                <a:pos x="connsiteX23" y="connsiteY23"/>
+              </a:cxn>
+              <a:cxn ang="0">
+                <a:pos x="connsiteX24" y="connsiteY24"/>
+              </a:cxn>
+              <a:cxn ang="0">
+                <a:pos x="connsiteX25" y="connsiteY25"/>
+              </a:cxn>
+              <a:cxn ang="0">
+                <a:pos x="connsiteX26" y="connsiteY26"/>
+              </a:cxn>
+            </a:cxnLst>
+            <a:rect l="l" t="t" r="r" b="b"/>
+            <a:pathLst>
+              <a:path w="1055077" h="351692">
+                <a:moveTo>
+                  <a:pt x="0" y="196947"/>
+                </a:moveTo>
+                <a:cubicBezTo>
+                  <a:pt x="23446" y="192258"/>
+                  <a:pt x="48361" y="173461"/>
+                  <a:pt x="70338" y="182880"/>
+                </a:cubicBezTo>
+                <a:cubicBezTo>
+                  <a:pt x="139849" y="212671"/>
+                  <a:pt x="48135" y="339831"/>
+                  <a:pt x="140677" y="154744"/>
+                </a:cubicBezTo>
+                <a:cubicBezTo>
+                  <a:pt x="164123" y="182880"/>
+                  <a:pt x="191352" y="208253"/>
+                  <a:pt x="211015" y="239151"/>
+                </a:cubicBezTo>
+                <a:cubicBezTo>
+                  <a:pt x="224572" y="260455"/>
+                  <a:pt x="234763" y="334357"/>
+                  <a:pt x="239151" y="309489"/>
+                </a:cubicBezTo>
+                <a:cubicBezTo>
+                  <a:pt x="257098" y="207791"/>
+                  <a:pt x="248529" y="103163"/>
+                  <a:pt x="253218" y="0"/>
+                </a:cubicBezTo>
+                <a:cubicBezTo>
+                  <a:pt x="267286" y="18757"/>
+                  <a:pt x="286185" y="34721"/>
+                  <a:pt x="295421" y="56271"/>
+                </a:cubicBezTo>
+                <a:cubicBezTo>
+                  <a:pt x="314706" y="101269"/>
+                  <a:pt x="310468" y="156213"/>
+                  <a:pt x="337624" y="196947"/>
+                </a:cubicBezTo>
+                <a:cubicBezTo>
+                  <a:pt x="351632" y="217958"/>
+                  <a:pt x="384517" y="215704"/>
+                  <a:pt x="407963" y="225083"/>
+                </a:cubicBezTo>
+                <a:cubicBezTo>
+                  <a:pt x="418007" y="275303"/>
+                  <a:pt x="409311" y="333939"/>
+                  <a:pt x="492369" y="323557"/>
+                </a:cubicBezTo>
+                <a:cubicBezTo>
+                  <a:pt x="512110" y="321089"/>
+                  <a:pt x="520504" y="295422"/>
+                  <a:pt x="534572" y="281354"/>
+                </a:cubicBezTo>
+                <a:cubicBezTo>
+                  <a:pt x="548640" y="215705"/>
+                  <a:pt x="546749" y="144457"/>
+                  <a:pt x="576775" y="84406"/>
+                </a:cubicBezTo>
+                <a:cubicBezTo>
+                  <a:pt x="586154" y="65649"/>
+                  <a:pt x="600591" y="120156"/>
+                  <a:pt x="604911" y="140677"/>
+                </a:cubicBezTo>
+                <a:cubicBezTo>
+                  <a:pt x="619530" y="210116"/>
+                  <a:pt x="623668" y="281354"/>
+                  <a:pt x="633046" y="351692"/>
+                </a:cubicBezTo>
+                <a:cubicBezTo>
+                  <a:pt x="642424" y="323557"/>
+                  <a:pt x="633046" y="276665"/>
+                  <a:pt x="661181" y="267286"/>
+                </a:cubicBezTo>
+                <a:cubicBezTo>
+                  <a:pt x="683864" y="259725"/>
+                  <a:pt x="653049" y="346504"/>
+                  <a:pt x="675249" y="337624"/>
+                </a:cubicBezTo>
+                <a:cubicBezTo>
+                  <a:pt x="710351" y="323584"/>
+                  <a:pt x="712763" y="271975"/>
+                  <a:pt x="731520" y="239151"/>
+                </a:cubicBezTo>
+                <a:cubicBezTo>
+                  <a:pt x="756559" y="314265"/>
+                  <a:pt x="739398" y="284726"/>
+                  <a:pt x="759655" y="196947"/>
+                </a:cubicBezTo>
+                <a:cubicBezTo>
+                  <a:pt x="767331" y="163683"/>
+                  <a:pt x="778412" y="131298"/>
+                  <a:pt x="787791" y="98474"/>
+                </a:cubicBezTo>
+                <a:cubicBezTo>
+                  <a:pt x="792480" y="121920"/>
+                  <a:pt x="797703" y="145266"/>
+                  <a:pt x="801858" y="168812"/>
+                </a:cubicBezTo>
+                <a:cubicBezTo>
+                  <a:pt x="811772" y="224991"/>
+                  <a:pt x="775875" y="319584"/>
+                  <a:pt x="829994" y="337624"/>
+                </a:cubicBezTo>
+                <a:cubicBezTo>
+                  <a:pt x="879130" y="354003"/>
+                  <a:pt x="830716" y="232925"/>
+                  <a:pt x="844061" y="182880"/>
+                </a:cubicBezTo>
+                <a:cubicBezTo>
+                  <a:pt x="850102" y="160225"/>
+                  <a:pt x="872196" y="145366"/>
+                  <a:pt x="886264" y="126609"/>
+                </a:cubicBezTo>
+                <a:cubicBezTo>
+                  <a:pt x="896478" y="177676"/>
+                  <a:pt x="921013" y="311797"/>
+                  <a:pt x="942535" y="337624"/>
+                </a:cubicBezTo>
+                <a:cubicBezTo>
+                  <a:pt x="955960" y="353734"/>
+                  <a:pt x="961292" y="300111"/>
+                  <a:pt x="970671" y="281354"/>
+                </a:cubicBezTo>
+                <a:cubicBezTo>
+                  <a:pt x="994285" y="375812"/>
+                  <a:pt x="966208" y="331860"/>
+                  <a:pt x="1026941" y="295421"/>
+                </a:cubicBezTo>
+                <a:cubicBezTo>
+                  <a:pt x="1034983" y="290596"/>
+                  <a:pt x="1045698" y="295421"/>
+                  <a:pt x="1055077" y="295421"/>
+                </a:cubicBezTo>
+              </a:path>
+            </a:pathLst>
+          </a:custGeom>
+          <a:noFill/>
+          <a:ln>
+            <a:solidFill>
+              <a:srgbClr val="FF0000"/>
+            </a:solidFill>
+          </a:ln>
+        </p:spPr>
+        <p:style>
+          <a:lnRef idx="2">
+            <a:schemeClr val="accent1">
+              <a:shade val="50000"/>
+            </a:schemeClr>
+          </a:lnRef>
+          <a:fillRef idx="1">
+            <a:schemeClr val="accent1"/>
+          </a:fillRef>
+          <a:effectRef idx="0">
+            <a:schemeClr val="accent1"/>
+          </a:effectRef>
+          <a:fontRef idx="minor">
+            <a:schemeClr val="lt1"/>
+          </a:fontRef>
+        </p:style>
+        <p:txBody>
+          <a:bodyPr rtlCol="0" anchor="ctr"/>
+          <a:lstStyle/>
+          <a:p>
+            <a:pPr algn="ctr"/>
+            <a:endParaRPr lang="en-US"/>
           </a:p>
         </p:txBody>
       </p:sp>

</xml_diff>

<commit_message>
:pencil:, :books: :camera: phase two updates, renaming, more notes
</commit_message>
<xml_diff>
--- a/ENC222-0149_2017.pptx
+++ b/ENC222-0149_2017.pptx
@@ -3377,7 +3377,31 @@
                 <a:ea typeface="Times New Roman" panose="02020603050405020304" pitchFamily="18" charset="0"/>
                 <a:cs typeface="Times New Roman" panose="02020603050405020304" pitchFamily="18" charset="0"/>
               </a:rPr>
-              <a:t>Spatio-temporal Remote Sensing, automated </a:t>
+              <a:t>Spatio-temporal </a:t>
+            </a:r>
+            <a:r>
+              <a:rPr lang="en-GB" sz="2400" b="1" u="sng">
+                <a:solidFill>
+                  <a:srgbClr val="000000"/>
+                </a:solidFill>
+                <a:effectLst/>
+                <a:latin typeface="Verdana" panose="020B0604030504040204" pitchFamily="34" charset="0"/>
+                <a:ea typeface="Times New Roman" panose="02020603050405020304" pitchFamily="18" charset="0"/>
+                <a:cs typeface="Times New Roman" panose="02020603050405020304" pitchFamily="18" charset="0"/>
+              </a:rPr>
+              <a:t>Remote Sensing &amp; </a:t>
+            </a:r>
+            <a:r>
+              <a:rPr lang="en-GB" sz="2400" b="1" u="sng" dirty="0">
+                <a:solidFill>
+                  <a:srgbClr val="000000"/>
+                </a:solidFill>
+                <a:effectLst/>
+                <a:latin typeface="Verdana" panose="020B0604030504040204" pitchFamily="34" charset="0"/>
+                <a:ea typeface="Times New Roman" panose="02020603050405020304" pitchFamily="18" charset="0"/>
+                <a:cs typeface="Times New Roman" panose="02020603050405020304" pitchFamily="18" charset="0"/>
+              </a:rPr>
+              <a:t>automated </a:t>
             </a:r>
             <a:r>
               <a:rPr lang="en-GB" sz="2400" b="1" i="1" u="sng" dirty="0">
@@ -3416,7 +3440,7 @@
               <a:t> </a:t>
             </a:r>
             <a:r>
-              <a:rPr lang="en-GB" sz="2400" b="1" u="sng" dirty="0">
+              <a:rPr lang="en-GB" sz="2400" b="1" u="sng">
                 <a:solidFill>
                   <a:srgbClr val="000000"/>
                 </a:solidFill>
@@ -3425,7 +3449,19 @@
                 <a:ea typeface="Times New Roman" panose="02020603050405020304" pitchFamily="18" charset="0"/>
                 <a:cs typeface="Times New Roman" panose="02020603050405020304" pitchFamily="18" charset="0"/>
               </a:rPr>
-              <a:t>sensors &amp; ANN to monitor and predict HABs and cyanotoxins.</a:t>
+              <a:t>sensors to </a:t>
+            </a:r>
+            <a:r>
+              <a:rPr lang="en-GB" sz="2400" b="1" u="sng" dirty="0">
+                <a:solidFill>
+                  <a:srgbClr val="000000"/>
+                </a:solidFill>
+                <a:effectLst/>
+                <a:latin typeface="Verdana" panose="020B0604030504040204" pitchFamily="34" charset="0"/>
+                <a:ea typeface="Times New Roman" panose="02020603050405020304" pitchFamily="18" charset="0"/>
+                <a:cs typeface="Times New Roman" panose="02020603050405020304" pitchFamily="18" charset="0"/>
+              </a:rPr>
+              <a:t>monitor and predict HABs and cyanotoxins.</a:t>
             </a:r>
             <a:br>
               <a:rPr lang="en-US" sz="2400" dirty="0">

</xml_diff>

<commit_message>
:pencil:, :books: :camera: phase two updates, paper 3 scores better, more notes
</commit_message>
<xml_diff>
--- a/ENC222-0149_2017.pptx
+++ b/ENC222-0149_2017.pptx
@@ -3377,31 +3377,7 @@
                 <a:ea typeface="Times New Roman" panose="02020603050405020304" pitchFamily="18" charset="0"/>
                 <a:cs typeface="Times New Roman" panose="02020603050405020304" pitchFamily="18" charset="0"/>
               </a:rPr>
-              <a:t>Spatio-temporal </a:t>
-            </a:r>
-            <a:r>
-              <a:rPr lang="en-GB" sz="2400" b="1" u="sng">
-                <a:solidFill>
-                  <a:srgbClr val="000000"/>
-                </a:solidFill>
-                <a:effectLst/>
-                <a:latin typeface="Verdana" panose="020B0604030504040204" pitchFamily="34" charset="0"/>
-                <a:ea typeface="Times New Roman" panose="02020603050405020304" pitchFamily="18" charset="0"/>
-                <a:cs typeface="Times New Roman" panose="02020603050405020304" pitchFamily="18" charset="0"/>
-              </a:rPr>
-              <a:t>Remote Sensing &amp; </a:t>
-            </a:r>
-            <a:r>
-              <a:rPr lang="en-GB" sz="2400" b="1" u="sng" dirty="0">
-                <a:solidFill>
-                  <a:srgbClr val="000000"/>
-                </a:solidFill>
-                <a:effectLst/>
-                <a:latin typeface="Verdana" panose="020B0604030504040204" pitchFamily="34" charset="0"/>
-                <a:ea typeface="Times New Roman" panose="02020603050405020304" pitchFamily="18" charset="0"/>
-                <a:cs typeface="Times New Roman" panose="02020603050405020304" pitchFamily="18" charset="0"/>
-              </a:rPr>
-              <a:t>automated </a:t>
+              <a:t>Spatio-temporal Remote Sensing, automated </a:t>
             </a:r>
             <a:r>
               <a:rPr lang="en-GB" sz="2400" b="1" i="1" u="sng" dirty="0">
@@ -3440,7 +3416,7 @@
               <a:t> </a:t>
             </a:r>
             <a:r>
-              <a:rPr lang="en-GB" sz="2400" b="1" u="sng">
+              <a:rPr lang="en-GB" sz="2400" b="1" u="sng" dirty="0">
                 <a:solidFill>
                   <a:srgbClr val="000000"/>
                 </a:solidFill>
@@ -3449,19 +3425,7 @@
                 <a:ea typeface="Times New Roman" panose="02020603050405020304" pitchFamily="18" charset="0"/>
                 <a:cs typeface="Times New Roman" panose="02020603050405020304" pitchFamily="18" charset="0"/>
               </a:rPr>
-              <a:t>sensors to </a:t>
-            </a:r>
-            <a:r>
-              <a:rPr lang="en-GB" sz="2400" b="1" u="sng" dirty="0">
-                <a:solidFill>
-                  <a:srgbClr val="000000"/>
-                </a:solidFill>
-                <a:effectLst/>
-                <a:latin typeface="Verdana" panose="020B0604030504040204" pitchFamily="34" charset="0"/>
-                <a:ea typeface="Times New Roman" panose="02020603050405020304" pitchFamily="18" charset="0"/>
-                <a:cs typeface="Times New Roman" panose="02020603050405020304" pitchFamily="18" charset="0"/>
-              </a:rPr>
-              <a:t>monitor and predict HABs and cyanotoxins.</a:t>
+              <a:t>sensors &amp; ANN to monitor and predict HABs and cyanotoxins.</a:t>
             </a:r>
             <a:br>
               <a:rPr lang="en-US" sz="2400" dirty="0">
@@ -4258,7 +4222,7 @@
         </p:nvSpPr>
         <p:spPr>
           <a:xfrm>
-            <a:off x="5101820" y="5444191"/>
+            <a:off x="4134255" y="5441959"/>
             <a:ext cx="762000" cy="285750"/>
           </a:xfrm>
           <a:prstGeom prst="flowChartMultidocument">
@@ -8188,7 +8152,7 @@
         </p:nvSpPr>
         <p:spPr>
           <a:xfrm>
-            <a:off x="4167283" y="5440359"/>
+            <a:off x="4955262" y="5454410"/>
             <a:ext cx="808222" cy="275531"/>
           </a:xfrm>
           <a:prstGeom prst="rect">
@@ -8237,7 +8201,7 @@
         </p:nvSpPr>
         <p:spPr>
           <a:xfrm>
-            <a:off x="4205619" y="5418227"/>
+            <a:off x="5039597" y="5463957"/>
             <a:ext cx="679374" cy="294353"/>
           </a:xfrm>
           <a:custGeom>

</xml_diff>